<commit_message>
Sam's Test Data 6/6
Data Collection for Sam
</commit_message>
<xml_diff>
--- a/StimPres/stimulus.pptx
+++ b/StimPres/stimulus.pptx
@@ -1117,7 +1117,7 @@
           <a:p>
             <a:fld id="{80454385-8AA6-476F-B993-0A62B51145DD}" type="datetimeFigureOut">
               <a:rPr lang="en-US" smtClean="0"/>
-              <a:t>4/7/2023</a:t>
+              <a:t>6/6/2023</a:t>
             </a:fld>
             <a:endParaRPr lang="en-US"/>
           </a:p>
@@ -1563,7 +1563,7 @@
           <a:p>
             <a:fld id="{11671E59-BB83-45A2-A119-4CFDC198A103}" type="datetime1">
               <a:rPr lang="en-US" smtClean="0"/>
-              <a:t>4/7/2023</a:t>
+              <a:t>6/6/2023</a:t>
             </a:fld>
             <a:endParaRPr lang="en-US"/>
           </a:p>
@@ -1731,7 +1731,7 @@
           <a:p>
             <a:fld id="{5F68BF0F-6CEC-431F-A24B-3F3943565BAE}" type="datetime1">
               <a:rPr lang="en-US" smtClean="0"/>
-              <a:t>4/7/2023</a:t>
+              <a:t>6/6/2023</a:t>
             </a:fld>
             <a:endParaRPr lang="en-US"/>
           </a:p>
@@ -1909,7 +1909,7 @@
           <a:p>
             <a:fld id="{2C491CDD-7F30-4F0E-9996-87B6C1501A39}" type="datetime1">
               <a:rPr lang="en-US" smtClean="0"/>
-              <a:t>4/7/2023</a:t>
+              <a:t>6/6/2023</a:t>
             </a:fld>
             <a:endParaRPr lang="en-US"/>
           </a:p>
@@ -2077,7 +2077,7 @@
           <a:p>
             <a:fld id="{1476E99E-AFB1-4856-881A-E9CFDEA7CFD8}" type="datetime1">
               <a:rPr lang="en-US" smtClean="0"/>
-              <a:t>4/7/2023</a:t>
+              <a:t>6/6/2023</a:t>
             </a:fld>
             <a:endParaRPr lang="en-US"/>
           </a:p>
@@ -2322,7 +2322,7 @@
           <a:p>
             <a:fld id="{DF7C5D1F-9D9B-4429-9DC6-910D085DA42B}" type="datetime1">
               <a:rPr lang="en-US" smtClean="0"/>
-              <a:t>4/7/2023</a:t>
+              <a:t>6/6/2023</a:t>
             </a:fld>
             <a:endParaRPr lang="en-US"/>
           </a:p>
@@ -2607,7 +2607,7 @@
           <a:p>
             <a:fld id="{75C89C9D-A2FE-42E3-8847-75A4D28208D3}" type="datetime1">
               <a:rPr lang="en-US" smtClean="0"/>
-              <a:t>4/7/2023</a:t>
+              <a:t>6/6/2023</a:t>
             </a:fld>
             <a:endParaRPr lang="en-US"/>
           </a:p>
@@ -3026,7 +3026,7 @@
           <a:p>
             <a:fld id="{8E6DF7A5-EDB0-44C7-BAAD-F3B5B553E549}" type="datetime1">
               <a:rPr lang="en-US" smtClean="0"/>
-              <a:t>4/7/2023</a:t>
+              <a:t>6/6/2023</a:t>
             </a:fld>
             <a:endParaRPr lang="en-US"/>
           </a:p>
@@ -3143,7 +3143,7 @@
           <a:p>
             <a:fld id="{41502DCB-DFDF-4FE0-86D5-617D5692AEC8}" type="datetime1">
               <a:rPr lang="en-US" smtClean="0"/>
-              <a:t>4/7/2023</a:t>
+              <a:t>6/6/2023</a:t>
             </a:fld>
             <a:endParaRPr lang="en-US"/>
           </a:p>
@@ -3238,7 +3238,7 @@
           <a:p>
             <a:fld id="{DAAAC218-3E7D-47E1-81B3-0AA2B3421DD7}" type="datetime1">
               <a:rPr lang="en-US" smtClean="0"/>
-              <a:t>4/7/2023</a:t>
+              <a:t>6/6/2023</a:t>
             </a:fld>
             <a:endParaRPr lang="en-US"/>
           </a:p>
@@ -3513,7 +3513,7 @@
           <a:p>
             <a:fld id="{8174D001-B0B7-4BD9-9FB6-08D30BA5DE56}" type="datetime1">
               <a:rPr lang="en-US" smtClean="0"/>
-              <a:t>4/7/2023</a:t>
+              <a:t>6/6/2023</a:t>
             </a:fld>
             <a:endParaRPr lang="en-US"/>
           </a:p>
@@ -3765,7 +3765,7 @@
           <a:p>
             <a:fld id="{38B56C4B-47A3-42BC-9CFE-58F02AA4D0F2}" type="datetime1">
               <a:rPr lang="en-US" smtClean="0"/>
-              <a:t>4/7/2023</a:t>
+              <a:t>6/6/2023</a:t>
             </a:fld>
             <a:endParaRPr lang="en-US"/>
           </a:p>
@@ -3976,7 +3976,7 @@
           <a:p>
             <a:fld id="{DB7A4736-C27A-4407-A2B4-E126A37D22E1}" type="datetime1">
               <a:rPr lang="en-US" smtClean="0"/>
-              <a:t>4/7/2023</a:t>
+              <a:t>6/6/2023</a:t>
             </a:fld>
             <a:endParaRPr lang="en-US"/>
           </a:p>
@@ -7368,11 +7368,19 @@
           <a:p>
             <a:r>
               <a:rPr lang="en-US" dirty="0"/>
-              <a:t>NOTE: If you must move or shift during </a:t>
+              <a:t>NOTE: If you must move or shift during the test make sure it is during </a:t>
             </a:r>
             <a:r>
               <a:rPr lang="en-US"/>
-              <a:t>the test</a:t>
+              <a:t>the wait </a:t>
+            </a:r>
+            <a:r>
+              <a:rPr lang="en-US" dirty="0"/>
+              <a:t>or the </a:t>
+            </a:r>
+            <a:r>
+              <a:rPr lang="en-US"/>
+              <a:t>sounds slides.</a:t>
             </a:r>
             <a:endParaRPr lang="en-US" dirty="0"/>
           </a:p>

</xml_diff>